<commit_message>
small modifications power point
</commit_message>
<xml_diff>
--- a/mmcvrp/MM-CVRP.pptx
+++ b/mmcvrp/MM-CVRP.pptx
@@ -110,6 +110,20 @@
     </a:lvl9pPr>
   </p:defaultTextStyle>
   <p:extLst>
+    <p:ext uri="{521415D9-36F7-43E2-AB2F-B90AF26B5E84}">
+      <p14:sectionLst xmlns:p14="http://schemas.microsoft.com/office/powerpoint/2010/main">
+        <p14:section name="Sezione predefinita" id="{1252B085-B13C-46F2-ACAD-5094205113FE}">
+          <p14:sldIdLst>
+            <p14:sldId id="256"/>
+            <p14:sldId id="258"/>
+            <p14:sldId id="262"/>
+            <p14:sldId id="259"/>
+            <p14:sldId id="260"/>
+            <p14:sldId id="261"/>
+          </p14:sldIdLst>
+        </p14:section>
+      </p14:sectionLst>
+    </p:ext>
     <p:ext uri="{EFAFB233-063F-42B5-8137-9DF3F51BA10A}">
       <p15:sldGuideLst xmlns:p15="http://schemas.microsoft.com/office/powerpoint/2012/main"/>
     </p:ext>
@@ -264,7 +278,7 @@
           <a:p>
             <a:fld id="{919822B0-46AB-49B3-A67C-B123A06D0FE2}" type="datetimeFigureOut">
               <a:rPr lang="it-IT" smtClean="0"/>
-              <a:t>04/04/2025</a:t>
+              <a:t>05/04/2025</a:t>
             </a:fld>
             <a:endParaRPr lang="it-IT"/>
           </a:p>
@@ -462,7 +476,7 @@
           <a:p>
             <a:fld id="{919822B0-46AB-49B3-A67C-B123A06D0FE2}" type="datetimeFigureOut">
               <a:rPr lang="it-IT" smtClean="0"/>
-              <a:t>04/04/2025</a:t>
+              <a:t>05/04/2025</a:t>
             </a:fld>
             <a:endParaRPr lang="it-IT"/>
           </a:p>
@@ -670,7 +684,7 @@
           <a:p>
             <a:fld id="{919822B0-46AB-49B3-A67C-B123A06D0FE2}" type="datetimeFigureOut">
               <a:rPr lang="it-IT" smtClean="0"/>
-              <a:t>04/04/2025</a:t>
+              <a:t>05/04/2025</a:t>
             </a:fld>
             <a:endParaRPr lang="it-IT"/>
           </a:p>
@@ -868,7 +882,7 @@
           <a:p>
             <a:fld id="{919822B0-46AB-49B3-A67C-B123A06D0FE2}" type="datetimeFigureOut">
               <a:rPr lang="it-IT" smtClean="0"/>
-              <a:t>04/04/2025</a:t>
+              <a:t>05/04/2025</a:t>
             </a:fld>
             <a:endParaRPr lang="it-IT"/>
           </a:p>
@@ -1143,7 +1157,7 @@
           <a:p>
             <a:fld id="{919822B0-46AB-49B3-A67C-B123A06D0FE2}" type="datetimeFigureOut">
               <a:rPr lang="it-IT" smtClean="0"/>
-              <a:t>04/04/2025</a:t>
+              <a:t>05/04/2025</a:t>
             </a:fld>
             <a:endParaRPr lang="it-IT"/>
           </a:p>
@@ -1408,7 +1422,7 @@
           <a:p>
             <a:fld id="{919822B0-46AB-49B3-A67C-B123A06D0FE2}" type="datetimeFigureOut">
               <a:rPr lang="it-IT" smtClean="0"/>
-              <a:t>04/04/2025</a:t>
+              <a:t>05/04/2025</a:t>
             </a:fld>
             <a:endParaRPr lang="it-IT"/>
           </a:p>
@@ -1820,7 +1834,7 @@
           <a:p>
             <a:fld id="{919822B0-46AB-49B3-A67C-B123A06D0FE2}" type="datetimeFigureOut">
               <a:rPr lang="it-IT" smtClean="0"/>
-              <a:t>04/04/2025</a:t>
+              <a:t>05/04/2025</a:t>
             </a:fld>
             <a:endParaRPr lang="it-IT"/>
           </a:p>
@@ -1961,7 +1975,7 @@
           <a:p>
             <a:fld id="{919822B0-46AB-49B3-A67C-B123A06D0FE2}" type="datetimeFigureOut">
               <a:rPr lang="it-IT" smtClean="0"/>
-              <a:t>04/04/2025</a:t>
+              <a:t>05/04/2025</a:t>
             </a:fld>
             <a:endParaRPr lang="it-IT"/>
           </a:p>
@@ -2074,7 +2088,7 @@
           <a:p>
             <a:fld id="{919822B0-46AB-49B3-A67C-B123A06D0FE2}" type="datetimeFigureOut">
               <a:rPr lang="it-IT" smtClean="0"/>
-              <a:t>04/04/2025</a:t>
+              <a:t>05/04/2025</a:t>
             </a:fld>
             <a:endParaRPr lang="it-IT"/>
           </a:p>
@@ -2385,7 +2399,7 @@
           <a:p>
             <a:fld id="{919822B0-46AB-49B3-A67C-B123A06D0FE2}" type="datetimeFigureOut">
               <a:rPr lang="it-IT" smtClean="0"/>
-              <a:t>04/04/2025</a:t>
+              <a:t>05/04/2025</a:t>
             </a:fld>
             <a:endParaRPr lang="it-IT"/>
           </a:p>
@@ -2673,7 +2687,7 @@
           <a:p>
             <a:fld id="{919822B0-46AB-49B3-A67C-B123A06D0FE2}" type="datetimeFigureOut">
               <a:rPr lang="it-IT" smtClean="0"/>
-              <a:t>04/04/2025</a:t>
+              <a:t>05/04/2025</a:t>
             </a:fld>
             <a:endParaRPr lang="it-IT"/>
           </a:p>
@@ -2914,7 +2928,7 @@
           <a:p>
             <a:fld id="{919822B0-46AB-49B3-A67C-B123A06D0FE2}" type="datetimeFigureOut">
               <a:rPr lang="it-IT" smtClean="0"/>
-              <a:t>04/04/2025</a:t>
+              <a:t>05/04/2025</a:t>
             </a:fld>
             <a:endParaRPr lang="it-IT"/>
           </a:p>
@@ -4857,7 +4871,13 @@
                         <a:rPr lang="it-IT" sz="1875" b="0" i="1" smtClean="0">
                           <a:latin typeface="Cambria Math" panose="02040503050406030204" pitchFamily="18" charset="0"/>
                         </a:rPr>
-                        <m:t>, 1</m:t>
+                        <m:t>, </m:t>
+                      </m:r>
+                      <m:r>
+                        <a:rPr lang="it-IT" sz="1875" b="0" i="1" smtClean="0">
+                          <a:latin typeface="Cambria Math" panose="02040503050406030204" pitchFamily="18" charset="0"/>
+                        </a:rPr>
+                        <m:t>0</m:t>
                       </m:r>
                       <m:r>
                         <a:rPr lang="en-US" sz="1875" i="1">
@@ -5855,14 +5875,7 @@
                                                   <a:latin typeface="Cambria Math" panose="02040503050406030204" pitchFamily="18" charset="0"/>
                                                   <a:ea typeface="Cambria Math" panose="02040503050406030204" pitchFamily="18" charset="0"/>
                                                 </a:rPr>
-                                                <m:t>=</m:t>
-                                              </m:r>
-                                              <m:r>
-                                                <a:rPr lang="it-IT" sz="1875" i="1">
-                                                  <a:latin typeface="Cambria Math" panose="02040503050406030204" pitchFamily="18" charset="0"/>
-                                                  <a:ea typeface="Cambria Math" panose="02040503050406030204" pitchFamily="18" charset="0"/>
-                                                </a:rPr>
-                                                <m:t>0</m:t>
+                                                <m:t>=0</m:t>
                                               </m:r>
                                             </m:lim>
                                           </m:limLow>
@@ -7630,13 +7643,7 @@
                             <a:rPr lang="it-IT" sz="1875" b="0" i="1" smtClean="0">
                               <a:latin typeface="Cambria Math" panose="02040503050406030204" pitchFamily="18" charset="0"/>
                             </a:rPr>
-                            <m:t>′</m:t>
-                          </m:r>
-                          <m:r>
-                            <a:rPr lang="it-IT" sz="1875" b="0" i="1" smtClean="0">
-                              <a:latin typeface="Cambria Math" panose="02040503050406030204" pitchFamily="18" charset="0"/>
-                            </a:rPr>
-                            <m:t>′</m:t>
+                            <m:t>′′</m:t>
                           </m:r>
                         </m:sup>
                       </m:sSup>
@@ -8864,8 +8871,8 @@
           </p:sp>
         </mc:Fallback>
       </mc:AlternateContent>
-      <mc:AlternateContent xmlns:mc="http://schemas.openxmlformats.org/markup-compatibility/2006">
-        <mc:Choice xmlns:a14="http://schemas.microsoft.com/office/drawing/2010/main" Requires="a14">
+      <mc:AlternateContent xmlns:mc="http://schemas.openxmlformats.org/markup-compatibility/2006" xmlns:a14="http://schemas.microsoft.com/office/drawing/2010/main">
+        <mc:Choice Requires="a14">
           <p:sp>
             <p:nvSpPr>
               <p:cNvPr id="3" name="CasellaDiTesto 2">
@@ -8894,6 +8901,7 @@
               </a:bodyPr>
               <a:lstStyle/>
               <a:p>
+                <a:pPr/>
                 <a14:m>
                   <m:oMathPara xmlns:m="http://schemas.openxmlformats.org/officeDocument/2006/math">
                     <m:oMathParaPr>
@@ -8957,7 +8965,7 @@
             </p:txBody>
           </p:sp>
         </mc:Choice>
-        <mc:Fallback>
+        <mc:Fallback xmlns="">
           <p:sp>
             <p:nvSpPr>
               <p:cNvPr id="3" name="CasellaDiTesto 2">
@@ -9002,8 +9010,8 @@
           </p:sp>
         </mc:Fallback>
       </mc:AlternateContent>
-      <mc:AlternateContent xmlns:mc="http://schemas.openxmlformats.org/markup-compatibility/2006">
-        <mc:Choice xmlns:a14="http://schemas.microsoft.com/office/drawing/2010/main" Requires="a14">
+      <mc:AlternateContent xmlns:mc="http://schemas.openxmlformats.org/markup-compatibility/2006" xmlns:a14="http://schemas.microsoft.com/office/drawing/2010/main">
+        <mc:Choice Requires="a14">
           <p:sp>
             <p:nvSpPr>
               <p:cNvPr id="5" name="CasellaDiTesto 4">
@@ -9032,6 +9040,7 @@
               </a:bodyPr>
               <a:lstStyle/>
               <a:p>
+                <a:pPr/>
                 <a14:m>
                   <m:oMathPara xmlns:m="http://schemas.openxmlformats.org/officeDocument/2006/math">
                     <m:oMathParaPr>
@@ -9095,7 +9104,7 @@
             </p:txBody>
           </p:sp>
         </mc:Choice>
-        <mc:Fallback>
+        <mc:Fallback xmlns="">
           <p:sp>
             <p:nvSpPr>
               <p:cNvPr id="5" name="CasellaDiTesto 4">
@@ -10894,15 +10903,7 @@
             </a:r>
             <a:r>
               <a:rPr lang="it-IT" dirty="0"/>
-              <a:t> with </a:t>
-            </a:r>
-            <a:r>
-              <a:rPr lang="it-IT"/>
-              <a:t>LNBS solver </a:t>
-            </a:r>
-            <a:r>
-              <a:rPr lang="it-IT" dirty="0"/>
-              <a:t>and  with a time </a:t>
+              <a:t> with LNBS solver and  with a time </a:t>
             </a:r>
             <a:r>
               <a:rPr lang="it-IT" dirty="0" err="1"/>
@@ -10957,6 +10958,92 @@
             <a:r>
               <a:rPr lang="it-IT" dirty="0"/>
               <a:t> gap.</a:t>
+            </a:r>
+          </a:p>
+          <a:p>
+            <a:r>
+              <a:rPr lang="it-IT" dirty="0"/>
+              <a:t>The </a:t>
+            </a:r>
+            <a:r>
+              <a:rPr lang="it-IT" dirty="0" err="1"/>
+              <a:t>performaces</a:t>
+            </a:r>
+            <a:r>
+              <a:rPr lang="it-IT" dirty="0"/>
+              <a:t> of the models </a:t>
+            </a:r>
+            <a:r>
+              <a:rPr lang="it-IT" dirty="0" err="1"/>
+              <a:t>have</a:t>
+            </a:r>
+            <a:r>
+              <a:rPr lang="it-IT" dirty="0"/>
+              <a:t> </a:t>
+            </a:r>
+            <a:r>
+              <a:rPr lang="it-IT" dirty="0" err="1"/>
+              <a:t>been</a:t>
+            </a:r>
+            <a:r>
+              <a:rPr lang="it-IT" dirty="0"/>
+              <a:t> </a:t>
+            </a:r>
+            <a:r>
+              <a:rPr lang="it-IT" dirty="0" err="1"/>
+              <a:t>evaluated</a:t>
+            </a:r>
+            <a:r>
+              <a:rPr lang="it-IT" dirty="0"/>
+              <a:t> </a:t>
+            </a:r>
+            <a:r>
+              <a:rPr lang="it-IT" dirty="0" err="1"/>
+              <a:t>against</a:t>
+            </a:r>
+            <a:r>
+              <a:rPr lang="it-IT" dirty="0"/>
+              <a:t> CP, SAT, SMT and MIP models </a:t>
+            </a:r>
+            <a:r>
+              <a:rPr lang="it-IT" dirty="0" err="1"/>
+              <a:t>developed</a:t>
+            </a:r>
+            <a:r>
+              <a:rPr lang="it-IT" dirty="0"/>
+              <a:t> to solve the </a:t>
+            </a:r>
+            <a:r>
+              <a:rPr lang="it-IT" dirty="0" err="1"/>
+              <a:t>same</a:t>
+            </a:r>
+            <a:r>
+              <a:rPr lang="it-IT" dirty="0"/>
+              <a:t> </a:t>
+            </a:r>
+            <a:r>
+              <a:rPr lang="it-IT" dirty="0" err="1"/>
+              <a:t>instances</a:t>
+            </a:r>
+            <a:r>
+              <a:rPr lang="it-IT" dirty="0"/>
+              <a:t> with the </a:t>
+            </a:r>
+            <a:r>
+              <a:rPr lang="it-IT" dirty="0" err="1"/>
+              <a:t>same</a:t>
+            </a:r>
+            <a:r>
+              <a:rPr lang="it-IT" dirty="0"/>
+              <a:t> </a:t>
+            </a:r>
+            <a:r>
+              <a:rPr lang="it-IT" dirty="0" err="1"/>
+              <a:t>experimental</a:t>
+            </a:r>
+            <a:r>
+              <a:rPr lang="it-IT" dirty="0"/>
+              <a:t> setup.</a:t>
             </a:r>
           </a:p>
           <a:p>
@@ -11103,10 +11190,10 @@
       </p:sp>
       <p:pic>
         <p:nvPicPr>
-          <p:cNvPr id="7" name="Segnaposto contenuto 6" descr="Immagine che contiene linea, Diagramma, testo, diagramma&#10;&#10;Il contenuto generato dall'IA potrebbe non essere corretto.">
+          <p:cNvPr id="4" name="Immagine 3" descr="Immagine che contiene testo, linea, Diagramma, diagramma&#10;&#10;Il contenuto generato dall'IA potrebbe non essere corretto.">
             <a:extLst>
               <a:ext uri="{FF2B5EF4-FFF2-40B4-BE49-F238E27FC236}">
-                <a16:creationId xmlns:a16="http://schemas.microsoft.com/office/drawing/2014/main" id="{A486A24C-EE5D-3295-DEE8-05AF2FF23636}"/>
+                <a16:creationId xmlns:a16="http://schemas.microsoft.com/office/drawing/2014/main" id="{8FA95E37-BE9F-0F41-107B-60B968177B4D}"/>
               </a:ext>
             </a:extLst>
           </p:cNvPr>
@@ -11123,13 +11210,14 @@
               </a:ext>
             </a:extLst>
           </a:blip>
-          <a:srcRect r="8718" b="-1"/>
-          <a:stretch/>
+          <a:stretch>
+            <a:fillRect/>
+          </a:stretch>
         </p:blipFill>
         <p:spPr>
           <a:xfrm>
-            <a:off x="0" y="1447800"/>
-            <a:ext cx="6741597" cy="4615976"/>
+            <a:off x="48984" y="1404258"/>
+            <a:ext cx="6738257" cy="4572000"/>
           </a:xfrm>
           <a:prstGeom prst="rect">
             <a:avLst/>
@@ -11138,10 +11226,10 @@
       </p:pic>
       <p:graphicFrame>
         <p:nvGraphicFramePr>
-          <p:cNvPr id="8" name="Tabella 7">
+          <p:cNvPr id="6" name="Tabella 5">
             <a:extLst>
               <a:ext uri="{FF2B5EF4-FFF2-40B4-BE49-F238E27FC236}">
-                <a16:creationId xmlns:a16="http://schemas.microsoft.com/office/drawing/2014/main" id="{278BABFD-98F1-A731-3932-CE2153E27281}"/>
+                <a16:creationId xmlns:a16="http://schemas.microsoft.com/office/drawing/2014/main" id="{AB0B99AC-5C71-4C8C-D4E4-DD3BE29B31E0}"/>
               </a:ext>
             </a:extLst>
           </p:cNvPr>
@@ -11151,14 +11239,14 @@
           <p:nvPr>
             <p:extLst>
               <p:ext uri="{D42A27DB-BD31-4B8C-83A1-F6EECF244321}">
-                <p14:modId xmlns:p14="http://schemas.microsoft.com/office/powerpoint/2010/main" val="996872694"/>
+                <p14:modId xmlns:p14="http://schemas.microsoft.com/office/powerpoint/2010/main" val="884042090"/>
               </p:ext>
             </p:extLst>
           </p:nvPr>
         </p:nvGraphicFramePr>
         <p:xfrm>
-          <a:off x="7206342" y="2036693"/>
-          <a:ext cx="4270028" cy="1097280"/>
+          <a:off x="6836226" y="1917096"/>
+          <a:ext cx="4354288" cy="3068562"/>
         </p:xfrm>
         <a:graphic>
           <a:graphicData uri="http://schemas.openxmlformats.org/drawingml/2006/table">
@@ -11167,23 +11255,37 @@
                 <a:tableStyleId>{5C22544A-7EE6-4342-B048-85BDC9FD1C3A}</a:tableStyleId>
               </a:tblPr>
               <a:tblGrid>
-                <a:gridCol w="2135014">
+                <a:gridCol w="2177144">
                   <a:extLst>
                     <a:ext uri="{9D8B030D-6E8A-4147-A177-3AD203B41FA5}">
-                      <a16:colId xmlns:a16="http://schemas.microsoft.com/office/drawing/2014/main" val="4064276738"/>
+                      <a16:colId xmlns:a16="http://schemas.microsoft.com/office/drawing/2014/main" val="3593701136"/>
                     </a:ext>
                   </a:extLst>
                 </a:gridCol>
-                <a:gridCol w="2135014">
+                <a:gridCol w="2177144">
                   <a:extLst>
                     <a:ext uri="{9D8B030D-6E8A-4147-A177-3AD203B41FA5}">
-                      <a16:colId xmlns:a16="http://schemas.microsoft.com/office/drawing/2014/main" val="2380021578"/>
+                      <a16:colId xmlns:a16="http://schemas.microsoft.com/office/drawing/2014/main" val="540074970"/>
                     </a:ext>
                   </a:extLst>
                 </a:gridCol>
               </a:tblGrid>
-              <a:tr h="333561">
-                <a:tc gridSpan="2">
+              <a:tr h="438366">
+                <a:tc>
+                  <a:txBody>
+                    <a:bodyPr/>
+                    <a:lstStyle/>
+                    <a:p>
+                      <a:pPr algn="ctr"/>
+                      <a:r>
+                        <a:rPr lang="it-IT" dirty="0"/>
+                        <a:t>Model</a:t>
+                      </a:r>
+                    </a:p>
+                  </a:txBody>
+                  <a:tcPr/>
+                </a:tc>
+                <a:tc>
                   <a:txBody>
                     <a:bodyPr/>
                     <a:lstStyle/>
@@ -11205,23 +11307,13 @@
                   </a:txBody>
                   <a:tcPr/>
                 </a:tc>
-                <a:tc hMerge="1">
-                  <a:txBody>
-                    <a:bodyPr/>
-                    <a:lstStyle/>
-                    <a:p>
-                      <a:endParaRPr lang="it-IT" dirty="0"/>
-                    </a:p>
-                  </a:txBody>
-                  <a:tcPr/>
-                </a:tc>
                 <a:extLst>
                   <a:ext uri="{0D108BD9-81ED-4DB2-BD59-A6C34878D82A}">
-                    <a16:rowId xmlns:a16="http://schemas.microsoft.com/office/drawing/2014/main" val="689857578"/>
+                    <a16:rowId xmlns:a16="http://schemas.microsoft.com/office/drawing/2014/main" val="3489050306"/>
                   </a:ext>
                 </a:extLst>
               </a:tr>
-              <a:tr h="333561">
+              <a:tr h="438366">
                 <a:tc>
                   <a:txBody>
                     <a:bodyPr/>
@@ -11230,7 +11322,7 @@
                       <a:pPr algn="ctr"/>
                       <a:r>
                         <a:rPr lang="it-IT" dirty="0" err="1"/>
-                        <a:t>Bound</a:t>
+                        <a:t>DIDP_Bound</a:t>
                       </a:r>
                       <a:endParaRPr lang="it-IT" dirty="0"/>
                     </a:p>
@@ -11245,24 +11337,55 @@
                       <a:pPr algn="ctr"/>
                       <a:r>
                         <a:rPr lang="it-IT" dirty="0"/>
-                        <a:t>No </a:t>
+                        <a:t>0.055</a:t>
                       </a:r>
+                    </a:p>
+                  </a:txBody>
+                  <a:tcPr/>
+                </a:tc>
+                <a:extLst>
+                  <a:ext uri="{0D108BD9-81ED-4DB2-BD59-A6C34878D82A}">
+                    <a16:rowId xmlns:a16="http://schemas.microsoft.com/office/drawing/2014/main" val="4021501833"/>
+                  </a:ext>
+                </a:extLst>
+              </a:tr>
+              <a:tr h="438366">
+                <a:tc>
+                  <a:txBody>
+                    <a:bodyPr/>
+                    <a:lstStyle/>
+                    <a:p>
+                      <a:pPr algn="ctr"/>
                       <a:r>
                         <a:rPr lang="it-IT" dirty="0" err="1"/>
-                        <a:t>Bound</a:t>
+                        <a:t>DIDP_No_Bound</a:t>
                       </a:r>
                       <a:endParaRPr lang="it-IT" dirty="0"/>
                     </a:p>
                   </a:txBody>
                   <a:tcPr/>
                 </a:tc>
+                <a:tc>
+                  <a:txBody>
+                    <a:bodyPr/>
+                    <a:lstStyle/>
+                    <a:p>
+                      <a:pPr algn="ctr"/>
+                      <a:r>
+                        <a:rPr lang="it-IT" b="1" dirty="0"/>
+                        <a:t>0.004</a:t>
+                      </a:r>
+                    </a:p>
+                  </a:txBody>
+                  <a:tcPr/>
+                </a:tc>
                 <a:extLst>
                   <a:ext uri="{0D108BD9-81ED-4DB2-BD59-A6C34878D82A}">
-                    <a16:rowId xmlns:a16="http://schemas.microsoft.com/office/drawing/2014/main" val="1627838624"/>
+                    <a16:rowId xmlns:a16="http://schemas.microsoft.com/office/drawing/2014/main" val="962369974"/>
                   </a:ext>
                 </a:extLst>
               </a:tr>
-              <a:tr h="333561">
+              <a:tr h="438366">
                 <a:tc>
                   <a:txBody>
                     <a:bodyPr/>
@@ -11271,7 +11394,7 @@
                       <a:pPr algn="ctr"/>
                       <a:r>
                         <a:rPr lang="it-IT" dirty="0"/>
-                        <a:t>0.05</a:t>
+                        <a:t>CP</a:t>
                       </a:r>
                     </a:p>
                   </a:txBody>
@@ -11285,7 +11408,7 @@
                       <a:pPr algn="ctr"/>
                       <a:r>
                         <a:rPr lang="it-IT" dirty="0"/>
-                        <a:t>0.0</a:t>
+                        <a:t>0.100</a:t>
                       </a:r>
                     </a:p>
                   </a:txBody>
@@ -11293,7 +11416,112 @@
                 </a:tc>
                 <a:extLst>
                   <a:ext uri="{0D108BD9-81ED-4DB2-BD59-A6C34878D82A}">
-                    <a16:rowId xmlns:a16="http://schemas.microsoft.com/office/drawing/2014/main" val="1250687243"/>
+                    <a16:rowId xmlns:a16="http://schemas.microsoft.com/office/drawing/2014/main" val="1775694432"/>
+                  </a:ext>
+                </a:extLst>
+              </a:tr>
+              <a:tr h="438366">
+                <a:tc>
+                  <a:txBody>
+                    <a:bodyPr/>
+                    <a:lstStyle/>
+                    <a:p>
+                      <a:pPr algn="ctr"/>
+                      <a:r>
+                        <a:rPr lang="it-IT" dirty="0"/>
+                        <a:t>SAT</a:t>
+                      </a:r>
+                    </a:p>
+                  </a:txBody>
+                  <a:tcPr/>
+                </a:tc>
+                <a:tc>
+                  <a:txBody>
+                    <a:bodyPr/>
+                    <a:lstStyle/>
+                    <a:p>
+                      <a:pPr algn="ctr"/>
+                      <a:r>
+                        <a:rPr lang="it-IT" dirty="0"/>
+                        <a:t>0.475</a:t>
+                      </a:r>
+                    </a:p>
+                  </a:txBody>
+                  <a:tcPr/>
+                </a:tc>
+                <a:extLst>
+                  <a:ext uri="{0D108BD9-81ED-4DB2-BD59-A6C34878D82A}">
+                    <a16:rowId xmlns:a16="http://schemas.microsoft.com/office/drawing/2014/main" val="3466667527"/>
+                  </a:ext>
+                </a:extLst>
+              </a:tr>
+              <a:tr h="438366">
+                <a:tc>
+                  <a:txBody>
+                    <a:bodyPr/>
+                    <a:lstStyle/>
+                    <a:p>
+                      <a:pPr algn="ctr"/>
+                      <a:r>
+                        <a:rPr lang="it-IT" dirty="0"/>
+                        <a:t>SMT</a:t>
+                      </a:r>
+                    </a:p>
+                  </a:txBody>
+                  <a:tcPr/>
+                </a:tc>
+                <a:tc>
+                  <a:txBody>
+                    <a:bodyPr/>
+                    <a:lstStyle/>
+                    <a:p>
+                      <a:pPr algn="ctr"/>
+                      <a:r>
+                        <a:rPr lang="it-IT" dirty="0"/>
+                        <a:t>0.237</a:t>
+                      </a:r>
+                    </a:p>
+                  </a:txBody>
+                  <a:tcPr/>
+                </a:tc>
+                <a:extLst>
+                  <a:ext uri="{0D108BD9-81ED-4DB2-BD59-A6C34878D82A}">
+                    <a16:rowId xmlns:a16="http://schemas.microsoft.com/office/drawing/2014/main" val="1355035596"/>
+                  </a:ext>
+                </a:extLst>
+              </a:tr>
+              <a:tr h="438366">
+                <a:tc>
+                  <a:txBody>
+                    <a:bodyPr/>
+                    <a:lstStyle/>
+                    <a:p>
+                      <a:pPr algn="ctr"/>
+                      <a:r>
+                        <a:rPr lang="it-IT" dirty="0"/>
+                        <a:t>MIP</a:t>
+                      </a:r>
+                    </a:p>
+                  </a:txBody>
+                  <a:tcPr/>
+                </a:tc>
+                <a:tc>
+                  <a:txBody>
+                    <a:bodyPr/>
+                    <a:lstStyle/>
+                    <a:p>
+                      <a:pPr algn="ctr"/>
+                      <a:r>
+                        <a:rPr lang="it-IT" dirty="0"/>
+                        <a:t>0228</a:t>
+                      </a:r>
+                    </a:p>
+                  </a:txBody>
+                  <a:tcPr/>
+                </a:tc>
+                <a:extLst>
+                  <a:ext uri="{0D108BD9-81ED-4DB2-BD59-A6C34878D82A}">
+                    <a16:rowId xmlns:a16="http://schemas.microsoft.com/office/drawing/2014/main" val="1174388688"/>
                   </a:ext>
                 </a:extLst>
               </a:tr>
@@ -11301,153 +11529,6 @@
           </a:graphicData>
         </a:graphic>
       </p:graphicFrame>
-      <p:sp>
-        <p:nvSpPr>
-          <p:cNvPr id="10" name="CasellaDiTesto 9">
-            <a:extLst>
-              <a:ext uri="{FF2B5EF4-FFF2-40B4-BE49-F238E27FC236}">
-                <a16:creationId xmlns:a16="http://schemas.microsoft.com/office/drawing/2014/main" id="{F180E8EE-0FE5-9A8A-1CB1-CB0337B8FCB3}"/>
-              </a:ext>
-            </a:extLst>
-          </p:cNvPr>
-          <p:cNvSpPr txBox="1"/>
-          <p:nvPr/>
-        </p:nvSpPr>
-        <p:spPr>
-          <a:xfrm>
-            <a:off x="7206342" y="3499098"/>
-            <a:ext cx="4270027" cy="923330"/>
-          </a:xfrm>
-          <a:prstGeom prst="rect">
-            <a:avLst/>
-          </a:prstGeom>
-          <a:noFill/>
-        </p:spPr>
-        <p:txBody>
-          <a:bodyPr wrap="square" rtlCol="0">
-            <a:spAutoFit/>
-          </a:bodyPr>
-          <a:lstStyle/>
-          <a:p>
-            <a:r>
-              <a:rPr lang="it-IT" dirty="0"/>
-              <a:t>The </a:t>
-            </a:r>
-            <a:r>
-              <a:rPr lang="it-IT" dirty="0" err="1"/>
-              <a:t>defined</a:t>
-            </a:r>
-            <a:r>
-              <a:rPr lang="it-IT" dirty="0"/>
-              <a:t> dual </a:t>
-            </a:r>
-            <a:r>
-              <a:rPr lang="it-IT" dirty="0" err="1"/>
-              <a:t>bound</a:t>
-            </a:r>
-            <a:r>
-              <a:rPr lang="it-IT" dirty="0"/>
-              <a:t> </a:t>
-            </a:r>
-            <a:r>
-              <a:rPr lang="it-IT" dirty="0" err="1"/>
-              <a:t>is</a:t>
-            </a:r>
-            <a:r>
-              <a:rPr lang="it-IT" dirty="0"/>
-              <a:t> </a:t>
-            </a:r>
-            <a:r>
-              <a:rPr lang="it-IT" dirty="0" err="1"/>
-              <a:t>probably</a:t>
-            </a:r>
-            <a:r>
-              <a:rPr lang="it-IT" dirty="0"/>
-              <a:t> </a:t>
-            </a:r>
-            <a:r>
-              <a:rPr lang="it-IT" dirty="0" err="1"/>
-              <a:t>better</a:t>
-            </a:r>
-            <a:r>
-              <a:rPr lang="it-IT" dirty="0"/>
-              <a:t> </a:t>
-            </a:r>
-            <a:r>
-              <a:rPr lang="it-IT" dirty="0" err="1"/>
-              <a:t>at</a:t>
-            </a:r>
-            <a:r>
-              <a:rPr lang="it-IT" dirty="0"/>
-              <a:t> </a:t>
-            </a:r>
-            <a:r>
-              <a:rPr lang="it-IT" dirty="0" err="1"/>
-              <a:t>pruning</a:t>
-            </a:r>
-            <a:r>
-              <a:rPr lang="it-IT" dirty="0"/>
-              <a:t> the </a:t>
-            </a:r>
-            <a:r>
-              <a:rPr lang="it-IT" dirty="0" err="1"/>
-              <a:t>solution</a:t>
-            </a:r>
-            <a:r>
-              <a:rPr lang="it-IT" dirty="0"/>
-              <a:t> </a:t>
-            </a:r>
-            <a:r>
-              <a:rPr lang="it-IT" dirty="0" err="1"/>
-              <a:t>space</a:t>
-            </a:r>
-            <a:r>
-              <a:rPr lang="it-IT" dirty="0"/>
-              <a:t> </a:t>
-            </a:r>
-            <a:r>
-              <a:rPr lang="it-IT" dirty="0" err="1"/>
-              <a:t>rather</a:t>
-            </a:r>
-            <a:r>
-              <a:rPr lang="it-IT" dirty="0"/>
-              <a:t> </a:t>
-            </a:r>
-            <a:r>
-              <a:rPr lang="it-IT" dirty="0" err="1"/>
-              <a:t>than</a:t>
-            </a:r>
-            <a:r>
-              <a:rPr lang="it-IT" dirty="0"/>
-              <a:t> </a:t>
-            </a:r>
-            <a:r>
-              <a:rPr lang="it-IT" dirty="0" err="1"/>
-              <a:t>guiding</a:t>
-            </a:r>
-            <a:r>
-              <a:rPr lang="it-IT" dirty="0"/>
-              <a:t> the </a:t>
-            </a:r>
-            <a:r>
-              <a:rPr lang="it-IT" dirty="0" err="1"/>
-              <a:t>search</a:t>
-            </a:r>
-            <a:r>
-              <a:rPr lang="it-IT" dirty="0"/>
-              <a:t> </a:t>
-            </a:r>
-            <a:r>
-              <a:rPr lang="it-IT" dirty="0" err="1"/>
-              <a:t>process</a:t>
-            </a:r>
-            <a:r>
-              <a:rPr lang="it-IT" dirty="0"/>
-              <a:t>.</a:t>
-            </a:r>
-          </a:p>
-        </p:txBody>
-      </p:sp>
     </p:spTree>
     <p:extLst>
       <p:ext uri="{BB962C8B-B14F-4D97-AF65-F5344CB8AC3E}">

</xml_diff>